<commit_message>
added tables and graphs
</commit_message>
<xml_diff>
--- a/study_presentation.pptx
+++ b/study_presentation.pptx
@@ -3313,6 +3313,14 @@
 <file path=ppt/slides/slide1.xml><?xml version="1.0" encoding="utf-8"?>
 <p:sld xmlns:a="http://schemas.openxmlformats.org/drawingml/2006/main" xmlns:r="http://schemas.openxmlformats.org/officeDocument/2006/relationships" xmlns:p="http://schemas.openxmlformats.org/presentationml/2006/main">
   <p:cSld>
+    <p:bg>
+      <p:bgPr>
+        <a:solidFill>
+          <a:schemeClr val="bg1"/>
+        </a:solidFill>
+        <a:effectLst/>
+      </p:bgPr>
+    </p:bg>
     <p:spTree>
       <p:nvGrpSpPr>
         <p:cNvPr id="1" name=""/>
@@ -3329,6 +3337,136 @@
       </p:grpSpPr>
       <p:sp>
         <p:nvSpPr>
+          <p:cNvPr id="8" name="Rectangle 7">
+            <a:extLst>
+              <a:ext uri="{FF2B5EF4-FFF2-40B4-BE49-F238E27FC236}">
+                <a16:creationId xmlns:a16="http://schemas.microsoft.com/office/drawing/2014/main" id="{23962611-DFD5-4092-AAFD-559E3DFCE2C9}"/>
+              </a:ext>
+              <a:ext uri="{C183D7F6-B498-43B3-948B-1728B52AA6E4}">
+                <adec:decorative xmlns:adec="http://schemas.microsoft.com/office/drawing/2017/decorative" val="1"/>
+              </a:ext>
+            </a:extLst>
+          </p:cNvPr>
+          <p:cNvSpPr>
+            <a:spLocks noGrp="1" noRot="1" noChangeAspect="1" noMove="1" noResize="1" noEditPoints="1" noAdjustHandles="1" noChangeArrowheads="1" noChangeShapeType="1" noTextEdit="1"/>
+          </p:cNvSpPr>
+          <p:nvPr>
+            <p:extLst>
+              <p:ext uri="{386F3935-93C4-4BCD-93E2-E3B085C9AB24}">
+                <p16:designElem xmlns:p16="http://schemas.microsoft.com/office/powerpoint/2015/main" val="1"/>
+              </p:ext>
+            </p:extLst>
+          </p:nvPr>
+        </p:nvSpPr>
+        <p:spPr>
+          <a:xfrm>
+            <a:off x="475488" y="0"/>
+            <a:ext cx="10910292" cy="6858000"/>
+          </a:xfrm>
+          <a:prstGeom prst="rect">
+            <a:avLst/>
+          </a:prstGeom>
+          <a:gradFill>
+            <a:gsLst>
+              <a:gs pos="0">
+                <a:schemeClr val="accent1">
+                  <a:lumMod val="90000"/>
+                </a:schemeClr>
+              </a:gs>
+              <a:gs pos="25000">
+                <a:schemeClr val="accent1">
+                  <a:lumMod val="90000"/>
+                </a:schemeClr>
+              </a:gs>
+              <a:gs pos="94000">
+                <a:schemeClr val="bg2">
+                  <a:lumMod val="25000"/>
+                </a:schemeClr>
+              </a:gs>
+              <a:gs pos="100000">
+                <a:schemeClr val="bg2">
+                  <a:lumMod val="25000"/>
+                </a:schemeClr>
+              </a:gs>
+            </a:gsLst>
+            <a:lin ang="4200000" scaled="0"/>
+          </a:gradFill>
+          <a:ln>
+            <a:noFill/>
+          </a:ln>
+        </p:spPr>
+        <p:style>
+          <a:lnRef idx="2">
+            <a:schemeClr val="accent1">
+              <a:shade val="50000"/>
+            </a:schemeClr>
+          </a:lnRef>
+          <a:fillRef idx="1">
+            <a:schemeClr val="accent1"/>
+          </a:fillRef>
+          <a:effectRef idx="0">
+            <a:schemeClr val="accent1"/>
+          </a:effectRef>
+          <a:fontRef idx="minor">
+            <a:schemeClr val="lt1"/>
+          </a:fontRef>
+        </p:style>
+        <p:txBody>
+          <a:bodyPr rtlCol="0" anchor="ctr"/>
+          <a:lstStyle/>
+          <a:p>
+            <a:pPr algn="ctr"/>
+            <a:endParaRPr lang="en-US"/>
+          </a:p>
+        </p:txBody>
+      </p:sp>
+      <p:pic>
+        <p:nvPicPr>
+          <p:cNvPr id="10" name="Picture 9">
+            <a:extLst>
+              <a:ext uri="{FF2B5EF4-FFF2-40B4-BE49-F238E27FC236}">
+                <a16:creationId xmlns:a16="http://schemas.microsoft.com/office/drawing/2014/main" id="{2270F1FA-0425-408F-9861-80BF5AFB276D}"/>
+              </a:ext>
+              <a:ext uri="{C183D7F6-B498-43B3-948B-1728B52AA6E4}">
+                <adec:decorative xmlns:adec="http://schemas.microsoft.com/office/drawing/2017/decorative" val="1"/>
+              </a:ext>
+            </a:extLst>
+          </p:cNvPr>
+          <p:cNvPicPr>
+            <a:picLocks noGrp="1" noRot="1" noChangeAspect="1" noMove="1" noResize="1" noEditPoints="1" noAdjustHandles="1" noChangeArrowheads="1" noChangeShapeType="1" noCrop="1"/>
+          </p:cNvPicPr>
+          <p:nvPr>
+            <p:extLst>
+              <p:ext uri="{386F3935-93C4-4BCD-93E2-E3B085C9AB24}">
+                <p16:designElem xmlns:p16="http://schemas.microsoft.com/office/powerpoint/2015/main" val="1"/>
+              </p:ext>
+            </p:extLst>
+          </p:nvPr>
+        </p:nvPicPr>
+        <p:blipFill>
+          <a:blip r:embed="rId2">
+            <a:extLst>
+              <a:ext uri="{28A0092B-C50C-407E-A947-70E740481C1C}">
+                <a14:useLocalDpi xmlns:a14="http://schemas.microsoft.com/office/drawing/2010/main" val="0"/>
+              </a:ext>
+            </a:extLst>
+          </a:blip>
+          <a:stretch>
+            <a:fillRect/>
+          </a:stretch>
+        </p:blipFill>
+        <p:spPr>
+          <a:xfrm>
+            <a:off x="0" y="0"/>
+            <a:ext cx="12192000" cy="6858000"/>
+          </a:xfrm>
+          <a:prstGeom prst="rect">
+            <a:avLst/>
+          </a:prstGeom>
+        </p:spPr>
+      </p:pic>
+      <p:sp>
+        <p:nvSpPr>
           <p:cNvPr id="2" name="Title 1">
             <a:extLst>
               <a:ext uri="{FF2B5EF4-FFF2-40B4-BE49-F238E27FC236}">
@@ -3343,13 +3481,24 @@
             <p:ph type="ctrTitle"/>
           </p:nvPr>
         </p:nvSpPr>
-        <p:spPr/>
-        <p:txBody>
-          <a:bodyPr/>
-          <a:lstStyle/>
-          <a:p>
-            <a:r>
-              <a:rPr lang="en-US" dirty="0"/>
+        <p:spPr>
+          <a:xfrm>
+            <a:off x="3045368" y="2043663"/>
+            <a:ext cx="6105194" cy="2031055"/>
+          </a:xfrm>
+        </p:spPr>
+        <p:txBody>
+          <a:bodyPr>
+            <a:normAutofit/>
+          </a:bodyPr>
+          <a:lstStyle/>
+          <a:p>
+            <a:r>
+              <a:rPr lang="en-US" sz="5600">
+                <a:solidFill>
+                  <a:srgbClr val="FFFFFF"/>
+                </a:solidFill>
+              </a:rPr>
               <a:t>Tax Rates &amp; Economic Outcomes</a:t>
             </a:r>
           </a:p>
@@ -3371,18 +3520,59 @@
             <p:ph type="subTitle" idx="1"/>
           </p:nvPr>
         </p:nvSpPr>
-        <p:spPr/>
-        <p:txBody>
-          <a:bodyPr/>
-          <a:lstStyle/>
-          <a:p>
-            <a:r>
-              <a:rPr lang="en-US" dirty="0"/>
+        <p:spPr>
+          <a:xfrm>
+            <a:off x="3045368" y="4074718"/>
+            <a:ext cx="6105194" cy="682079"/>
+          </a:xfrm>
+        </p:spPr>
+        <p:txBody>
+          <a:bodyPr>
+            <a:normAutofit/>
+          </a:bodyPr>
+          <a:lstStyle/>
+          <a:p>
+            <a:r>
+              <a:rPr lang="en-US">
+                <a:solidFill>
+                  <a:srgbClr val="FFFFFF"/>
+                </a:solidFill>
+              </a:rPr>
               <a:t>Is There A Relationship?</a:t>
             </a:r>
           </a:p>
         </p:txBody>
       </p:sp>
+      <p:pic>
+        <p:nvPicPr>
+          <p:cNvPr id="4" name="Picture 3">
+            <a:extLst>
+              <a:ext uri="{FF2B5EF4-FFF2-40B4-BE49-F238E27FC236}">
+                <a16:creationId xmlns:a16="http://schemas.microsoft.com/office/drawing/2014/main" id="{708F3FB4-C893-BA4A-896B-37815586C40C}"/>
+              </a:ext>
+            </a:extLst>
+          </p:cNvPr>
+          <p:cNvPicPr>
+            <a:picLocks noChangeAspect="1"/>
+          </p:cNvPicPr>
+          <p:nvPr/>
+        </p:nvPicPr>
+        <p:blipFill>
+          <a:blip r:embed="rId3"/>
+          <a:stretch>
+            <a:fillRect/>
+          </a:stretch>
+        </p:blipFill>
+        <p:spPr>
+          <a:xfrm>
+            <a:off x="0" y="-10424"/>
+            <a:ext cx="12192000" cy="6858000"/>
+          </a:xfrm>
+          <a:prstGeom prst="rect">
+            <a:avLst/>
+          </a:prstGeom>
+        </p:spPr>
+      </p:pic>
     </p:spTree>
     <p:extLst>
       <p:ext uri="{BB962C8B-B14F-4D97-AF65-F5344CB8AC3E}">
@@ -3399,6 +3589,14 @@
 <file path=ppt/slides/slide2.xml><?xml version="1.0" encoding="utf-8"?>
 <p:sld xmlns:a="http://schemas.openxmlformats.org/drawingml/2006/main" xmlns:r="http://schemas.openxmlformats.org/officeDocument/2006/relationships" xmlns:p="http://schemas.openxmlformats.org/presentationml/2006/main">
   <p:cSld>
+    <p:bg>
+      <p:bgPr>
+        <a:solidFill>
+          <a:schemeClr val="bg1"/>
+        </a:solidFill>
+        <a:effectLst/>
+      </p:bgPr>
+    </p:bg>
     <p:spTree>
       <p:nvGrpSpPr>
         <p:cNvPr id="1" name=""/>
@@ -3413,34 +3611,196 @@
           <a:chExt cx="0" cy="0"/>
         </a:xfrm>
       </p:grpSpPr>
-      <p:sp>
-        <p:nvSpPr>
-          <p:cNvPr id="2" name="Title 1">
-            <a:extLst>
-              <a:ext uri="{FF2B5EF4-FFF2-40B4-BE49-F238E27FC236}">
-                <a16:creationId xmlns:a16="http://schemas.microsoft.com/office/drawing/2014/main" id="{8C47584C-F6B6-0D42-ADF8-0A9C0315C1A1}"/>
-              </a:ext>
-            </a:extLst>
-          </p:cNvPr>
-          <p:cNvSpPr>
-            <a:spLocks noGrp="1"/>
-          </p:cNvSpPr>
-          <p:nvPr>
-            <p:ph type="title"/>
-          </p:nvPr>
-        </p:nvSpPr>
-        <p:spPr/>
-        <p:txBody>
-          <a:bodyPr/>
-          <a:lstStyle/>
-          <a:p>
-            <a:r>
-              <a:rPr lang="en-US" dirty="0"/>
-              <a:t>Description And Motivation</a:t>
-            </a:r>
-          </a:p>
-        </p:txBody>
-      </p:sp>
+      <p:sp useBgFill="1">
+        <p:nvSpPr>
+          <p:cNvPr id="8" name="Rectangle 7">
+            <a:extLst>
+              <a:ext uri="{FF2B5EF4-FFF2-40B4-BE49-F238E27FC236}">
+                <a16:creationId xmlns:a16="http://schemas.microsoft.com/office/drawing/2014/main" id="{3B854194-185D-494D-905C-7C7CB2E30F6E}"/>
+              </a:ext>
+              <a:ext uri="{C183D7F6-B498-43B3-948B-1728B52AA6E4}">
+                <adec:decorative xmlns:adec="http://schemas.microsoft.com/office/drawing/2017/decorative" val="1"/>
+              </a:ext>
+            </a:extLst>
+          </p:cNvPr>
+          <p:cNvSpPr>
+            <a:spLocks noGrp="1" noRot="1" noChangeAspect="1" noMove="1" noResize="1" noEditPoints="1" noAdjustHandles="1" noChangeArrowheads="1" noChangeShapeType="1" noTextEdit="1"/>
+          </p:cNvSpPr>
+          <p:nvPr>
+            <p:extLst>
+              <p:ext uri="{386F3935-93C4-4BCD-93E2-E3B085C9AB24}">
+                <p16:designElem xmlns:p16="http://schemas.microsoft.com/office/powerpoint/2015/main" val="1"/>
+              </p:ext>
+            </p:extLst>
+          </p:nvPr>
+        </p:nvSpPr>
+        <p:spPr>
+          <a:xfrm>
+            <a:off x="1" y="0"/>
+            <a:ext cx="6082110" cy="6858000"/>
+          </a:xfrm>
+          <a:prstGeom prst="rect">
+            <a:avLst/>
+          </a:prstGeom>
+          <a:ln>
+            <a:noFill/>
+          </a:ln>
+        </p:spPr>
+        <p:style>
+          <a:lnRef idx="2">
+            <a:schemeClr val="accent1">
+              <a:shade val="50000"/>
+            </a:schemeClr>
+          </a:lnRef>
+          <a:fillRef idx="1">
+            <a:schemeClr val="accent1"/>
+          </a:fillRef>
+          <a:effectRef idx="0">
+            <a:schemeClr val="accent1"/>
+          </a:effectRef>
+          <a:fontRef idx="minor">
+            <a:schemeClr val="lt1"/>
+          </a:fontRef>
+        </p:style>
+        <p:txBody>
+          <a:bodyPr rtlCol="0" anchor="ctr"/>
+          <a:lstStyle/>
+          <a:p>
+            <a:pPr algn="ctr"/>
+            <a:endParaRPr lang="en-US"/>
+          </a:p>
+        </p:txBody>
+      </p:sp>
+      <p:sp>
+        <p:nvSpPr>
+          <p:cNvPr id="10" name="Rectangle 9">
+            <a:extLst>
+              <a:ext uri="{FF2B5EF4-FFF2-40B4-BE49-F238E27FC236}">
+                <a16:creationId xmlns:a16="http://schemas.microsoft.com/office/drawing/2014/main" id="{B4F5FA0D-0104-4987-8241-EFF7C85B88DE}"/>
+              </a:ext>
+              <a:ext uri="{C183D7F6-B498-43B3-948B-1728B52AA6E4}">
+                <adec:decorative xmlns:adec="http://schemas.microsoft.com/office/drawing/2017/decorative" val="1"/>
+              </a:ext>
+            </a:extLst>
+          </p:cNvPr>
+          <p:cNvSpPr>
+            <a:spLocks noGrp="1" noRot="1" noChangeAspect="1" noMove="1" noResize="1" noEditPoints="1" noAdjustHandles="1" noChangeArrowheads="1" noChangeShapeType="1" noTextEdit="1"/>
+          </p:cNvSpPr>
+          <p:nvPr>
+            <p:extLst>
+              <p:ext uri="{386F3935-93C4-4BCD-93E2-E3B085C9AB24}">
+                <p16:designElem xmlns:p16="http://schemas.microsoft.com/office/powerpoint/2015/main" val="1"/>
+              </p:ext>
+            </p:extLst>
+          </p:nvPr>
+        </p:nvSpPr>
+        <p:spPr>
+          <a:xfrm>
+            <a:off x="1" y="0"/>
+            <a:ext cx="12191998" cy="6858000"/>
+          </a:xfrm>
+          <a:prstGeom prst="rect">
+            <a:avLst/>
+          </a:prstGeom>
+          <a:gradFill>
+            <a:gsLst>
+              <a:gs pos="0">
+                <a:schemeClr val="accent1">
+                  <a:lumMod val="90000"/>
+                </a:schemeClr>
+              </a:gs>
+              <a:gs pos="25000">
+                <a:schemeClr val="accent1">
+                  <a:lumMod val="90000"/>
+                </a:schemeClr>
+              </a:gs>
+              <a:gs pos="94000">
+                <a:schemeClr val="bg2">
+                  <a:lumMod val="25000"/>
+                </a:schemeClr>
+              </a:gs>
+              <a:gs pos="100000">
+                <a:schemeClr val="bg2">
+                  <a:lumMod val="25000"/>
+                </a:schemeClr>
+              </a:gs>
+            </a:gsLst>
+            <a:lin ang="4200000" scaled="0"/>
+          </a:gradFill>
+          <a:ln>
+            <a:noFill/>
+          </a:ln>
+        </p:spPr>
+        <p:style>
+          <a:lnRef idx="2">
+            <a:schemeClr val="accent1">
+              <a:shade val="50000"/>
+            </a:schemeClr>
+          </a:lnRef>
+          <a:fillRef idx="1">
+            <a:schemeClr val="accent1"/>
+          </a:fillRef>
+          <a:effectRef idx="0">
+            <a:schemeClr val="accent1"/>
+          </a:effectRef>
+          <a:fontRef idx="minor">
+            <a:schemeClr val="lt1"/>
+          </a:fontRef>
+        </p:style>
+        <p:txBody>
+          <a:bodyPr rtlCol="0" anchor="ctr"/>
+          <a:lstStyle/>
+          <a:p>
+            <a:pPr algn="ctr"/>
+            <a:endParaRPr lang="en-US"/>
+          </a:p>
+        </p:txBody>
+      </p:sp>
+      <p:pic>
+        <p:nvPicPr>
+          <p:cNvPr id="12" name="Picture 11">
+            <a:extLst>
+              <a:ext uri="{FF2B5EF4-FFF2-40B4-BE49-F238E27FC236}">
+                <a16:creationId xmlns:a16="http://schemas.microsoft.com/office/drawing/2014/main" id="{2897127E-6CEF-446C-BE87-93B7C46E49D1}"/>
+              </a:ext>
+              <a:ext uri="{C183D7F6-B498-43B3-948B-1728B52AA6E4}">
+                <adec:decorative xmlns:adec="http://schemas.microsoft.com/office/drawing/2017/decorative" val="1"/>
+              </a:ext>
+            </a:extLst>
+          </p:cNvPr>
+          <p:cNvPicPr>
+            <a:picLocks noGrp="1" noRot="1" noChangeAspect="1" noMove="1" noResize="1" noEditPoints="1" noAdjustHandles="1" noChangeArrowheads="1" noChangeShapeType="1" noCrop="1"/>
+          </p:cNvPicPr>
+          <p:nvPr>
+            <p:extLst>
+              <p:ext uri="{386F3935-93C4-4BCD-93E2-E3B085C9AB24}">
+                <p16:designElem xmlns:p16="http://schemas.microsoft.com/office/powerpoint/2015/main" val="1"/>
+              </p:ext>
+            </p:extLst>
+          </p:nvPr>
+        </p:nvPicPr>
+        <p:blipFill>
+          <a:blip r:embed="rId2">
+            <a:extLst>
+              <a:ext uri="{28A0092B-C50C-407E-A947-70E740481C1C}">
+                <a14:useLocalDpi xmlns:a14="http://schemas.microsoft.com/office/drawing/2010/main" val="0"/>
+              </a:ext>
+            </a:extLst>
+          </a:blip>
+          <a:stretch>
+            <a:fillRect/>
+          </a:stretch>
+        </p:blipFill>
+        <p:spPr>
+          <a:xfrm>
+            <a:off x="0" y="0"/>
+            <a:ext cx="12192000" cy="6858000"/>
+          </a:xfrm>
+          <a:prstGeom prst="rect">
+            <a:avLst/>
+          </a:prstGeom>
+        </p:spPr>
+      </p:pic>
       <p:sp>
         <p:nvSpPr>
           <p:cNvPr id="3" name="Content Placeholder 2">
@@ -3457,12 +3817,43 @@
             <p:ph idx="1"/>
           </p:nvPr>
         </p:nvSpPr>
-        <p:spPr/>
-        <p:txBody>
-          <a:bodyPr/>
-          <a:lstStyle/>
-          <a:p>
-            <a:endParaRPr lang="en-US" dirty="0"/>
+        <p:spPr>
+          <a:xfrm>
+            <a:off x="6090574" y="801866"/>
+            <a:ext cx="5306084" cy="5230634"/>
+          </a:xfrm>
+        </p:spPr>
+        <p:txBody>
+          <a:bodyPr anchor="ctr">
+            <a:normAutofit/>
+          </a:bodyPr>
+          <a:lstStyle/>
+          <a:p>
+            <a:r>
+              <a:rPr lang="en-US" sz="4000" dirty="0">
+                <a:solidFill>
+                  <a:srgbClr val="000000"/>
+                </a:solidFill>
+              </a:rPr>
+              <a:t>Theory vs Theory</a:t>
+            </a:r>
+          </a:p>
+          <a:p>
+            <a:endParaRPr lang="en-US" sz="4000" dirty="0">
+              <a:solidFill>
+                <a:srgbClr val="000000"/>
+              </a:solidFill>
+            </a:endParaRPr>
+          </a:p>
+          <a:p>
+            <a:r>
+              <a:rPr lang="en-US" sz="4000" dirty="0">
+                <a:solidFill>
+                  <a:srgbClr val="000000"/>
+                </a:solidFill>
+              </a:rPr>
+              <a:t>Practical </a:t>
+            </a:r>
           </a:p>
         </p:txBody>
       </p:sp>
@@ -3689,6 +4080,14 @@
 <file path=ppt/slides/slide5.xml><?xml version="1.0" encoding="utf-8"?>
 <p:sld xmlns:a="http://schemas.openxmlformats.org/drawingml/2006/main" xmlns:r="http://schemas.openxmlformats.org/officeDocument/2006/relationships" xmlns:p="http://schemas.openxmlformats.org/presentationml/2006/main">
   <p:cSld>
+    <p:bg>
+      <p:bgPr>
+        <a:solidFill>
+          <a:schemeClr val="bg1"/>
+        </a:solidFill>
+        <a:effectLst/>
+      </p:bgPr>
+    </p:bg>
     <p:spTree>
       <p:nvGrpSpPr>
         <p:cNvPr id="1" name=""/>
@@ -3703,6 +4102,196 @@
           <a:chExt cx="0" cy="0"/>
         </a:xfrm>
       </p:grpSpPr>
+      <p:sp useBgFill="1">
+        <p:nvSpPr>
+          <p:cNvPr id="11" name="Rectangle 10">
+            <a:extLst>
+              <a:ext uri="{FF2B5EF4-FFF2-40B4-BE49-F238E27FC236}">
+                <a16:creationId xmlns:a16="http://schemas.microsoft.com/office/drawing/2014/main" id="{3B854194-185D-494D-905C-7C7CB2E30F6E}"/>
+              </a:ext>
+              <a:ext uri="{C183D7F6-B498-43B3-948B-1728B52AA6E4}">
+                <adec:decorative xmlns:adec="http://schemas.microsoft.com/office/drawing/2017/decorative" val="1"/>
+              </a:ext>
+            </a:extLst>
+          </p:cNvPr>
+          <p:cNvSpPr>
+            <a:spLocks noGrp="1" noRot="1" noChangeAspect="1" noMove="1" noResize="1" noEditPoints="1" noAdjustHandles="1" noChangeArrowheads="1" noChangeShapeType="1" noTextEdit="1"/>
+          </p:cNvSpPr>
+          <p:nvPr>
+            <p:extLst>
+              <p:ext uri="{386F3935-93C4-4BCD-93E2-E3B085C9AB24}">
+                <p16:designElem xmlns:p16="http://schemas.microsoft.com/office/powerpoint/2015/main" val="1"/>
+              </p:ext>
+            </p:extLst>
+          </p:nvPr>
+        </p:nvSpPr>
+        <p:spPr>
+          <a:xfrm>
+            <a:off x="1" y="0"/>
+            <a:ext cx="6082110" cy="6858000"/>
+          </a:xfrm>
+          <a:prstGeom prst="rect">
+            <a:avLst/>
+          </a:prstGeom>
+          <a:ln>
+            <a:noFill/>
+          </a:ln>
+        </p:spPr>
+        <p:style>
+          <a:lnRef idx="2">
+            <a:schemeClr val="accent1">
+              <a:shade val="50000"/>
+            </a:schemeClr>
+          </a:lnRef>
+          <a:fillRef idx="1">
+            <a:schemeClr val="accent1"/>
+          </a:fillRef>
+          <a:effectRef idx="0">
+            <a:schemeClr val="accent1"/>
+          </a:effectRef>
+          <a:fontRef idx="minor">
+            <a:schemeClr val="lt1"/>
+          </a:fontRef>
+        </p:style>
+        <p:txBody>
+          <a:bodyPr rtlCol="0" anchor="ctr"/>
+          <a:lstStyle/>
+          <a:p>
+            <a:pPr algn="ctr"/>
+            <a:endParaRPr lang="en-US"/>
+          </a:p>
+        </p:txBody>
+      </p:sp>
+      <p:sp>
+        <p:nvSpPr>
+          <p:cNvPr id="13" name="Rectangle 12">
+            <a:extLst>
+              <a:ext uri="{FF2B5EF4-FFF2-40B4-BE49-F238E27FC236}">
+                <a16:creationId xmlns:a16="http://schemas.microsoft.com/office/drawing/2014/main" id="{B4F5FA0D-0104-4987-8241-EFF7C85B88DE}"/>
+              </a:ext>
+              <a:ext uri="{C183D7F6-B498-43B3-948B-1728B52AA6E4}">
+                <adec:decorative xmlns:adec="http://schemas.microsoft.com/office/drawing/2017/decorative" val="1"/>
+              </a:ext>
+            </a:extLst>
+          </p:cNvPr>
+          <p:cNvSpPr>
+            <a:spLocks noGrp="1" noRot="1" noChangeAspect="1" noMove="1" noResize="1" noEditPoints="1" noAdjustHandles="1" noChangeArrowheads="1" noChangeShapeType="1" noTextEdit="1"/>
+          </p:cNvSpPr>
+          <p:nvPr>
+            <p:extLst>
+              <p:ext uri="{386F3935-93C4-4BCD-93E2-E3B085C9AB24}">
+                <p16:designElem xmlns:p16="http://schemas.microsoft.com/office/powerpoint/2015/main" val="1"/>
+              </p:ext>
+            </p:extLst>
+          </p:nvPr>
+        </p:nvSpPr>
+        <p:spPr>
+          <a:xfrm>
+            <a:off x="1" y="0"/>
+            <a:ext cx="12191998" cy="6858000"/>
+          </a:xfrm>
+          <a:prstGeom prst="rect">
+            <a:avLst/>
+          </a:prstGeom>
+          <a:gradFill>
+            <a:gsLst>
+              <a:gs pos="0">
+                <a:schemeClr val="accent1">
+                  <a:lumMod val="90000"/>
+                </a:schemeClr>
+              </a:gs>
+              <a:gs pos="25000">
+                <a:schemeClr val="accent1">
+                  <a:lumMod val="90000"/>
+                </a:schemeClr>
+              </a:gs>
+              <a:gs pos="94000">
+                <a:schemeClr val="bg2">
+                  <a:lumMod val="25000"/>
+                </a:schemeClr>
+              </a:gs>
+              <a:gs pos="100000">
+                <a:schemeClr val="bg2">
+                  <a:lumMod val="25000"/>
+                </a:schemeClr>
+              </a:gs>
+            </a:gsLst>
+            <a:lin ang="4200000" scaled="0"/>
+          </a:gradFill>
+          <a:ln>
+            <a:noFill/>
+          </a:ln>
+        </p:spPr>
+        <p:style>
+          <a:lnRef idx="2">
+            <a:schemeClr val="accent1">
+              <a:shade val="50000"/>
+            </a:schemeClr>
+          </a:lnRef>
+          <a:fillRef idx="1">
+            <a:schemeClr val="accent1"/>
+          </a:fillRef>
+          <a:effectRef idx="0">
+            <a:schemeClr val="accent1"/>
+          </a:effectRef>
+          <a:fontRef idx="minor">
+            <a:schemeClr val="lt1"/>
+          </a:fontRef>
+        </p:style>
+        <p:txBody>
+          <a:bodyPr rtlCol="0" anchor="ctr"/>
+          <a:lstStyle/>
+          <a:p>
+            <a:pPr algn="ctr"/>
+            <a:endParaRPr lang="en-US"/>
+          </a:p>
+        </p:txBody>
+      </p:sp>
+      <p:pic>
+        <p:nvPicPr>
+          <p:cNvPr id="15" name="Picture 14">
+            <a:extLst>
+              <a:ext uri="{FF2B5EF4-FFF2-40B4-BE49-F238E27FC236}">
+                <a16:creationId xmlns:a16="http://schemas.microsoft.com/office/drawing/2014/main" id="{2897127E-6CEF-446C-BE87-93B7C46E49D1}"/>
+              </a:ext>
+              <a:ext uri="{C183D7F6-B498-43B3-948B-1728B52AA6E4}">
+                <adec:decorative xmlns:adec="http://schemas.microsoft.com/office/drawing/2017/decorative" val="1"/>
+              </a:ext>
+            </a:extLst>
+          </p:cNvPr>
+          <p:cNvPicPr>
+            <a:picLocks noGrp="1" noRot="1" noChangeAspect="1" noMove="1" noResize="1" noEditPoints="1" noAdjustHandles="1" noChangeArrowheads="1" noChangeShapeType="1" noCrop="1"/>
+          </p:cNvPicPr>
+          <p:nvPr>
+            <p:extLst>
+              <p:ext uri="{386F3935-93C4-4BCD-93E2-E3B085C9AB24}">
+                <p16:designElem xmlns:p16="http://schemas.microsoft.com/office/powerpoint/2015/main" val="1"/>
+              </p:ext>
+            </p:extLst>
+          </p:nvPr>
+        </p:nvPicPr>
+        <p:blipFill>
+          <a:blip r:embed="rId2">
+            <a:extLst>
+              <a:ext uri="{28A0092B-C50C-407E-A947-70E740481C1C}">
+                <a14:useLocalDpi xmlns:a14="http://schemas.microsoft.com/office/drawing/2010/main" val="0"/>
+              </a:ext>
+            </a:extLst>
+          </a:blip>
+          <a:stretch>
+            <a:fillRect/>
+          </a:stretch>
+        </p:blipFill>
+        <p:spPr>
+          <a:xfrm>
+            <a:off x="0" y="0"/>
+            <a:ext cx="12192000" cy="6858000"/>
+          </a:xfrm>
+          <a:prstGeom prst="rect">
+            <a:avLst/>
+          </a:prstGeom>
+        </p:spPr>
+      </p:pic>
       <p:sp>
         <p:nvSpPr>
           <p:cNvPr id="5" name="Title 4">
@@ -3719,14 +4308,25 @@
             <p:ph type="title"/>
           </p:nvPr>
         </p:nvSpPr>
-        <p:spPr/>
-        <p:txBody>
-          <a:bodyPr/>
-          <a:lstStyle/>
-          <a:p>
-            <a:r>
-              <a:rPr lang="en-US" dirty="0"/>
-              <a:t>Hypothesis Testing Description</a:t>
+        <p:spPr>
+          <a:xfrm>
+            <a:off x="640079" y="2053641"/>
+            <a:ext cx="3669161" cy="2760098"/>
+          </a:xfrm>
+        </p:spPr>
+        <p:txBody>
+          <a:bodyPr>
+            <a:normAutofit/>
+          </a:bodyPr>
+          <a:lstStyle/>
+          <a:p>
+            <a:r>
+              <a:rPr lang="en-US" dirty="0">
+                <a:solidFill>
+                  <a:srgbClr val="FFFFFF"/>
+                </a:solidFill>
+              </a:rPr>
+              <a:t>Testing Methods</a:t>
             </a:r>
           </a:p>
         </p:txBody>
@@ -3747,32 +4347,49 @@
             <p:ph idx="1"/>
           </p:nvPr>
         </p:nvSpPr>
-        <p:spPr/>
-        <p:txBody>
-          <a:bodyPr/>
-          <a:lstStyle/>
-          <a:p>
-            <a:r>
-              <a:rPr lang="en-US" dirty="0"/>
-              <a:t>Null vs Alternate</a:t>
-            </a:r>
-          </a:p>
-          <a:p>
-            <a:endParaRPr lang="en-US" dirty="0"/>
-          </a:p>
-          <a:p>
-            <a:r>
-              <a:rPr lang="en-US" dirty="0"/>
-              <a:t>Testing methods</a:t>
-            </a:r>
-          </a:p>
-          <a:p>
-            <a:endParaRPr lang="en-US" dirty="0"/>
-          </a:p>
-          <a:p>
-            <a:r>
-              <a:rPr lang="en-US" dirty="0"/>
-              <a:t>Variables Used</a:t>
+        <p:spPr>
+          <a:xfrm>
+            <a:off x="6082111" y="326378"/>
+            <a:ext cx="5306084" cy="5230634"/>
+          </a:xfrm>
+        </p:spPr>
+        <p:txBody>
+          <a:bodyPr anchor="ctr">
+            <a:normAutofit/>
+          </a:bodyPr>
+          <a:lstStyle/>
+          <a:p>
+            <a:r>
+              <a:rPr lang="en-US" sz="4000" dirty="0">
+                <a:solidFill>
+                  <a:srgbClr val="000000"/>
+                </a:solidFill>
+              </a:rPr>
+              <a:t>Correlation</a:t>
+            </a:r>
+          </a:p>
+          <a:p>
+            <a:endParaRPr lang="en-US" sz="4000" dirty="0">
+              <a:solidFill>
+                <a:srgbClr val="000000"/>
+              </a:solidFill>
+            </a:endParaRPr>
+          </a:p>
+          <a:p>
+            <a:endParaRPr lang="en-US" sz="4000" dirty="0">
+              <a:solidFill>
+                <a:srgbClr val="000000"/>
+              </a:solidFill>
+            </a:endParaRPr>
+          </a:p>
+          <a:p>
+            <a:r>
+              <a:rPr lang="en-US" sz="4000" dirty="0">
+                <a:solidFill>
+                  <a:srgbClr val="000000"/>
+                </a:solidFill>
+              </a:rPr>
+              <a:t>Hypothesis Testing</a:t>
             </a:r>
           </a:p>
         </p:txBody>
@@ -3807,62 +4424,64 @@
           <a:chExt cx="0" cy="0"/>
         </a:xfrm>
       </p:grpSpPr>
-      <p:sp>
-        <p:nvSpPr>
-          <p:cNvPr id="5" name="Title 4">
-            <a:extLst>
-              <a:ext uri="{FF2B5EF4-FFF2-40B4-BE49-F238E27FC236}">
-                <a16:creationId xmlns:a16="http://schemas.microsoft.com/office/drawing/2014/main" id="{F5B69406-6ED2-1844-B5AB-35B31E1564C2}"/>
-              </a:ext>
-            </a:extLst>
-          </p:cNvPr>
-          <p:cNvSpPr>
-            <a:spLocks noGrp="1"/>
-          </p:cNvSpPr>
-          <p:nvPr>
-            <p:ph type="title"/>
-          </p:nvPr>
-        </p:nvSpPr>
-        <p:spPr/>
-        <p:txBody>
-          <a:bodyPr/>
-          <a:lstStyle/>
-          <a:p>
-            <a:r>
-              <a:rPr lang="en-US" dirty="0"/>
-              <a:t>The Results Table Goes Here</a:t>
-            </a:r>
-          </a:p>
-        </p:txBody>
-      </p:sp>
-      <p:sp>
-        <p:nvSpPr>
-          <p:cNvPr id="6" name="Content Placeholder 5">
-            <a:extLst>
-              <a:ext uri="{FF2B5EF4-FFF2-40B4-BE49-F238E27FC236}">
-                <a16:creationId xmlns:a16="http://schemas.microsoft.com/office/drawing/2014/main" id="{2F383375-F4FD-424E-BCEA-C8EBBB119425}"/>
-              </a:ext>
-            </a:extLst>
-          </p:cNvPr>
-          <p:cNvSpPr>
-            <a:spLocks noGrp="1"/>
-          </p:cNvSpPr>
-          <p:nvPr>
-            <p:ph idx="1"/>
-          </p:nvPr>
-        </p:nvSpPr>
-        <p:spPr/>
-        <p:txBody>
-          <a:bodyPr/>
-          <a:lstStyle/>
-          <a:p>
-            <a:r>
-              <a:rPr lang="en-US" dirty="0"/>
-              <a:t>Results! Here!</a:t>
-            </a:r>
-          </a:p>
-        </p:txBody>
-      </p:sp>
+      <p:pic>
+        <p:nvPicPr>
+          <p:cNvPr id="10" name="Content Placeholder 9" descr="A screenshot of a cell phone&#10;&#10;Description automatically generated">
+            <a:extLst>
+              <a:ext uri="{FF2B5EF4-FFF2-40B4-BE49-F238E27FC236}">
+                <a16:creationId xmlns:a16="http://schemas.microsoft.com/office/drawing/2014/main" id="{8E67B333-7C69-614A-BC94-90830DE126A8}"/>
+              </a:ext>
+            </a:extLst>
+          </p:cNvPr>
+          <p:cNvPicPr>
+            <a:picLocks noGrp="1" noChangeAspect="1"/>
+          </p:cNvPicPr>
+          <p:nvPr>
+            <p:ph sz="half" idx="1"/>
+          </p:nvPr>
+        </p:nvPicPr>
+        <p:blipFill>
+          <a:blip r:embed="rId2"/>
+          <a:stretch>
+            <a:fillRect/>
+          </a:stretch>
+        </p:blipFill>
+        <p:spPr>
+          <a:xfrm>
+            <a:off x="143226" y="1751219"/>
+            <a:ext cx="5952774" cy="1566518"/>
+          </a:xfrm>
+        </p:spPr>
+      </p:pic>
+      <p:pic>
+        <p:nvPicPr>
+          <p:cNvPr id="12" name="Content Placeholder 11" descr="A screenshot of a cell phone&#10;&#10;Description automatically generated">
+            <a:extLst>
+              <a:ext uri="{FF2B5EF4-FFF2-40B4-BE49-F238E27FC236}">
+                <a16:creationId xmlns:a16="http://schemas.microsoft.com/office/drawing/2014/main" id="{B3E030E0-1C17-064A-861B-7ACAB1A33F0C}"/>
+              </a:ext>
+            </a:extLst>
+          </p:cNvPr>
+          <p:cNvPicPr>
+            <a:picLocks noGrp="1" noChangeAspect="1"/>
+          </p:cNvPicPr>
+          <p:nvPr>
+            <p:ph sz="half" idx="2"/>
+          </p:nvPr>
+        </p:nvPicPr>
+        <p:blipFill>
+          <a:blip r:embed="rId3"/>
+          <a:stretch>
+            <a:fillRect/>
+          </a:stretch>
+        </p:blipFill>
+        <p:spPr>
+          <a:xfrm>
+            <a:off x="6096000" y="0"/>
+            <a:ext cx="5952774" cy="5068957"/>
+          </a:xfrm>
+        </p:spPr>
+      </p:pic>
     </p:spTree>
     <p:extLst>
       <p:ext uri="{BB962C8B-B14F-4D97-AF65-F5344CB8AC3E}">
@@ -3879,6 +4498,14 @@
 <file path=ppt/slides/slide7.xml><?xml version="1.0" encoding="utf-8"?>
 <p:sld xmlns:a="http://schemas.openxmlformats.org/drawingml/2006/main" xmlns:r="http://schemas.openxmlformats.org/officeDocument/2006/relationships" xmlns:p="http://schemas.openxmlformats.org/presentationml/2006/main">
   <p:cSld>
+    <p:bg>
+      <p:bgPr>
+        <a:solidFill>
+          <a:schemeClr val="bg1"/>
+        </a:solidFill>
+        <a:effectLst/>
+      </p:bgPr>
+    </p:bg>
     <p:spTree>
       <p:nvGrpSpPr>
         <p:cNvPr id="1" name=""/>
@@ -3893,6 +4520,196 @@
           <a:chExt cx="0" cy="0"/>
         </a:xfrm>
       </p:grpSpPr>
+      <p:sp useBgFill="1">
+        <p:nvSpPr>
+          <p:cNvPr id="8" name="Rectangle 7">
+            <a:extLst>
+              <a:ext uri="{FF2B5EF4-FFF2-40B4-BE49-F238E27FC236}">
+                <a16:creationId xmlns:a16="http://schemas.microsoft.com/office/drawing/2014/main" id="{3B854194-185D-494D-905C-7C7CB2E30F6E}"/>
+              </a:ext>
+              <a:ext uri="{C183D7F6-B498-43B3-948B-1728B52AA6E4}">
+                <adec:decorative xmlns:adec="http://schemas.microsoft.com/office/drawing/2017/decorative" val="1"/>
+              </a:ext>
+            </a:extLst>
+          </p:cNvPr>
+          <p:cNvSpPr>
+            <a:spLocks noGrp="1" noRot="1" noChangeAspect="1" noMove="1" noResize="1" noEditPoints="1" noAdjustHandles="1" noChangeArrowheads="1" noChangeShapeType="1" noTextEdit="1"/>
+          </p:cNvSpPr>
+          <p:nvPr>
+            <p:extLst>
+              <p:ext uri="{386F3935-93C4-4BCD-93E2-E3B085C9AB24}">
+                <p16:designElem xmlns:p16="http://schemas.microsoft.com/office/powerpoint/2015/main" val="1"/>
+              </p:ext>
+            </p:extLst>
+          </p:nvPr>
+        </p:nvSpPr>
+        <p:spPr>
+          <a:xfrm>
+            <a:off x="1" y="0"/>
+            <a:ext cx="6082110" cy="6858000"/>
+          </a:xfrm>
+          <a:prstGeom prst="rect">
+            <a:avLst/>
+          </a:prstGeom>
+          <a:ln>
+            <a:noFill/>
+          </a:ln>
+        </p:spPr>
+        <p:style>
+          <a:lnRef idx="2">
+            <a:schemeClr val="accent1">
+              <a:shade val="50000"/>
+            </a:schemeClr>
+          </a:lnRef>
+          <a:fillRef idx="1">
+            <a:schemeClr val="accent1"/>
+          </a:fillRef>
+          <a:effectRef idx="0">
+            <a:schemeClr val="accent1"/>
+          </a:effectRef>
+          <a:fontRef idx="minor">
+            <a:schemeClr val="lt1"/>
+          </a:fontRef>
+        </p:style>
+        <p:txBody>
+          <a:bodyPr rtlCol="0" anchor="ctr"/>
+          <a:lstStyle/>
+          <a:p>
+            <a:pPr algn="ctr"/>
+            <a:endParaRPr lang="en-US"/>
+          </a:p>
+        </p:txBody>
+      </p:sp>
+      <p:sp>
+        <p:nvSpPr>
+          <p:cNvPr id="10" name="Rectangle 9">
+            <a:extLst>
+              <a:ext uri="{FF2B5EF4-FFF2-40B4-BE49-F238E27FC236}">
+                <a16:creationId xmlns:a16="http://schemas.microsoft.com/office/drawing/2014/main" id="{B4F5FA0D-0104-4987-8241-EFF7C85B88DE}"/>
+              </a:ext>
+              <a:ext uri="{C183D7F6-B498-43B3-948B-1728B52AA6E4}">
+                <adec:decorative xmlns:adec="http://schemas.microsoft.com/office/drawing/2017/decorative" val="1"/>
+              </a:ext>
+            </a:extLst>
+          </p:cNvPr>
+          <p:cNvSpPr>
+            <a:spLocks noGrp="1" noRot="1" noChangeAspect="1" noMove="1" noResize="1" noEditPoints="1" noAdjustHandles="1" noChangeArrowheads="1" noChangeShapeType="1" noTextEdit="1"/>
+          </p:cNvSpPr>
+          <p:nvPr>
+            <p:extLst>
+              <p:ext uri="{386F3935-93C4-4BCD-93E2-E3B085C9AB24}">
+                <p16:designElem xmlns:p16="http://schemas.microsoft.com/office/powerpoint/2015/main" val="1"/>
+              </p:ext>
+            </p:extLst>
+          </p:nvPr>
+        </p:nvSpPr>
+        <p:spPr>
+          <a:xfrm>
+            <a:off x="1" y="0"/>
+            <a:ext cx="12191998" cy="6858000"/>
+          </a:xfrm>
+          <a:prstGeom prst="rect">
+            <a:avLst/>
+          </a:prstGeom>
+          <a:gradFill>
+            <a:gsLst>
+              <a:gs pos="0">
+                <a:schemeClr val="accent1">
+                  <a:lumMod val="90000"/>
+                </a:schemeClr>
+              </a:gs>
+              <a:gs pos="25000">
+                <a:schemeClr val="accent1">
+                  <a:lumMod val="90000"/>
+                </a:schemeClr>
+              </a:gs>
+              <a:gs pos="94000">
+                <a:schemeClr val="bg2">
+                  <a:lumMod val="25000"/>
+                </a:schemeClr>
+              </a:gs>
+              <a:gs pos="100000">
+                <a:schemeClr val="bg2">
+                  <a:lumMod val="25000"/>
+                </a:schemeClr>
+              </a:gs>
+            </a:gsLst>
+            <a:lin ang="4200000" scaled="0"/>
+          </a:gradFill>
+          <a:ln>
+            <a:noFill/>
+          </a:ln>
+        </p:spPr>
+        <p:style>
+          <a:lnRef idx="2">
+            <a:schemeClr val="accent1">
+              <a:shade val="50000"/>
+            </a:schemeClr>
+          </a:lnRef>
+          <a:fillRef idx="1">
+            <a:schemeClr val="accent1"/>
+          </a:fillRef>
+          <a:effectRef idx="0">
+            <a:schemeClr val="accent1"/>
+          </a:effectRef>
+          <a:fontRef idx="minor">
+            <a:schemeClr val="lt1"/>
+          </a:fontRef>
+        </p:style>
+        <p:txBody>
+          <a:bodyPr rtlCol="0" anchor="ctr"/>
+          <a:lstStyle/>
+          <a:p>
+            <a:pPr algn="ctr"/>
+            <a:endParaRPr lang="en-US"/>
+          </a:p>
+        </p:txBody>
+      </p:sp>
+      <p:pic>
+        <p:nvPicPr>
+          <p:cNvPr id="12" name="Picture 11">
+            <a:extLst>
+              <a:ext uri="{FF2B5EF4-FFF2-40B4-BE49-F238E27FC236}">
+                <a16:creationId xmlns:a16="http://schemas.microsoft.com/office/drawing/2014/main" id="{2897127E-6CEF-446C-BE87-93B7C46E49D1}"/>
+              </a:ext>
+              <a:ext uri="{C183D7F6-B498-43B3-948B-1728B52AA6E4}">
+                <adec:decorative xmlns:adec="http://schemas.microsoft.com/office/drawing/2017/decorative" val="1"/>
+              </a:ext>
+            </a:extLst>
+          </p:cNvPr>
+          <p:cNvPicPr>
+            <a:picLocks noGrp="1" noRot="1" noChangeAspect="1" noMove="1" noResize="1" noEditPoints="1" noAdjustHandles="1" noChangeArrowheads="1" noChangeShapeType="1" noCrop="1"/>
+          </p:cNvPicPr>
+          <p:nvPr>
+            <p:extLst>
+              <p:ext uri="{386F3935-93C4-4BCD-93E2-E3B085C9AB24}">
+                <p16:designElem xmlns:p16="http://schemas.microsoft.com/office/powerpoint/2015/main" val="1"/>
+              </p:ext>
+            </p:extLst>
+          </p:nvPr>
+        </p:nvPicPr>
+        <p:blipFill>
+          <a:blip r:embed="rId2">
+            <a:extLst>
+              <a:ext uri="{28A0092B-C50C-407E-A947-70E740481C1C}">
+                <a14:useLocalDpi xmlns:a14="http://schemas.microsoft.com/office/drawing/2010/main" val="0"/>
+              </a:ext>
+            </a:extLst>
+          </a:blip>
+          <a:stretch>
+            <a:fillRect/>
+          </a:stretch>
+        </p:blipFill>
+        <p:spPr>
+          <a:xfrm>
+            <a:off x="0" y="0"/>
+            <a:ext cx="12192000" cy="6858000"/>
+          </a:xfrm>
+          <a:prstGeom prst="rect">
+            <a:avLst/>
+          </a:prstGeom>
+        </p:spPr>
+      </p:pic>
       <p:sp>
         <p:nvSpPr>
           <p:cNvPr id="2" name="Title 1">
@@ -3909,13 +4726,24 @@
             <p:ph type="title"/>
           </p:nvPr>
         </p:nvSpPr>
-        <p:spPr/>
-        <p:txBody>
-          <a:bodyPr/>
-          <a:lstStyle/>
-          <a:p>
-            <a:r>
-              <a:rPr lang="en-US" dirty="0"/>
+        <p:spPr>
+          <a:xfrm>
+            <a:off x="640079" y="2053641"/>
+            <a:ext cx="3669161" cy="2760098"/>
+          </a:xfrm>
+        </p:spPr>
+        <p:txBody>
+          <a:bodyPr>
+            <a:normAutofit/>
+          </a:bodyPr>
+          <a:lstStyle/>
+          <a:p>
+            <a:r>
+              <a:rPr lang="en-US">
+                <a:solidFill>
+                  <a:srgbClr val="FFFFFF"/>
+                </a:solidFill>
+              </a:rPr>
               <a:t>Conclusion &amp; Next Steps</a:t>
             </a:r>
           </a:p>
@@ -3937,22 +4765,41 @@
             <p:ph idx="1"/>
           </p:nvPr>
         </p:nvSpPr>
-        <p:spPr/>
-        <p:txBody>
-          <a:bodyPr/>
-          <a:lstStyle/>
-          <a:p>
-            <a:r>
-              <a:rPr lang="en-US" dirty="0"/>
+        <p:spPr>
+          <a:xfrm>
+            <a:off x="6082111" y="198362"/>
+            <a:ext cx="5306084" cy="5230634"/>
+          </a:xfrm>
+        </p:spPr>
+        <p:txBody>
+          <a:bodyPr anchor="ctr">
+            <a:normAutofit/>
+          </a:bodyPr>
+          <a:lstStyle/>
+          <a:p>
+            <a:r>
+              <a:rPr lang="en-US" sz="4000" dirty="0">
+                <a:solidFill>
+                  <a:srgbClr val="000000"/>
+                </a:solidFill>
+              </a:rPr>
               <a:t>What does this tell us?</a:t>
             </a:r>
           </a:p>
           <a:p>
-            <a:endParaRPr lang="en-US" dirty="0"/>
-          </a:p>
-          <a:p>
-            <a:r>
-              <a:rPr lang="en-US" dirty="0"/>
+            <a:endParaRPr lang="en-US" sz="4000" dirty="0">
+              <a:solidFill>
+                <a:srgbClr val="000000"/>
+              </a:solidFill>
+            </a:endParaRPr>
+          </a:p>
+          <a:p>
+            <a:r>
+              <a:rPr lang="en-US" sz="4000" dirty="0">
+                <a:solidFill>
+                  <a:srgbClr val="000000"/>
+                </a:solidFill>
+              </a:rPr>
               <a:t>Further study</a:t>
             </a:r>
           </a:p>

</xml_diff>